<commit_message>
Modified presentations and new test added
</commit_message>
<xml_diff>
--- a/1.lekce.pptx
+++ b/1.lekce.pptx
@@ -218,7 +218,7 @@
           <a:p>
             <a:fld id="{D20C3D66-FE2C-4D2A-AE80-F3E4BE289F92}" type="datetimeFigureOut">
               <a:rPr lang="cs-CZ" smtClean="0"/>
-              <a:t>10.10.2016</a:t>
+              <a:t>19.10.2016</a:t>
             </a:fld>
             <a:endParaRPr lang="cs-CZ"/>
           </a:p>
@@ -907,7 +907,7 @@
           <a:p>
             <a:fld id="{7F7304AD-F242-4632-87E6-EC5F38A9AA59}" type="datetimeFigureOut">
               <a:rPr lang="cs-CZ" smtClean="0"/>
-              <a:t>10.10.2016</a:t>
+              <a:t>19.10.2016</a:t>
             </a:fld>
             <a:endParaRPr lang="cs-CZ" dirty="0"/>
           </a:p>
@@ -1186,7 +1186,7 @@
           <a:p>
             <a:fld id="{7F7304AD-F242-4632-87E6-EC5F38A9AA59}" type="datetimeFigureOut">
               <a:rPr lang="cs-CZ" smtClean="0"/>
-              <a:t>10.10.2016</a:t>
+              <a:t>19.10.2016</a:t>
             </a:fld>
             <a:endParaRPr lang="cs-CZ" dirty="0"/>
           </a:p>
@@ -1429,7 +1429,7 @@
           <a:p>
             <a:fld id="{7F7304AD-F242-4632-87E6-EC5F38A9AA59}" type="datetimeFigureOut">
               <a:rPr lang="cs-CZ" smtClean="0"/>
-              <a:t>10.10.2016</a:t>
+              <a:t>19.10.2016</a:t>
             </a:fld>
             <a:endParaRPr lang="cs-CZ" dirty="0"/>
           </a:p>
@@ -1751,7 +1751,7 @@
           <a:p>
             <a:fld id="{7F7304AD-F242-4632-87E6-EC5F38A9AA59}" type="datetimeFigureOut">
               <a:rPr lang="cs-CZ" smtClean="0"/>
-              <a:t>10.10.2016</a:t>
+              <a:t>19.10.2016</a:t>
             </a:fld>
             <a:endParaRPr lang="cs-CZ" dirty="0"/>
           </a:p>
@@ -2236,7 +2236,7 @@
           <a:p>
             <a:fld id="{7F7304AD-F242-4632-87E6-EC5F38A9AA59}" type="datetimeFigureOut">
               <a:rPr lang="cs-CZ" smtClean="0"/>
-              <a:t>10.10.2016</a:t>
+              <a:t>19.10.2016</a:t>
             </a:fld>
             <a:endParaRPr lang="cs-CZ" dirty="0"/>
           </a:p>
@@ -2795,7 +2795,7 @@
           <a:p>
             <a:fld id="{7F7304AD-F242-4632-87E6-EC5F38A9AA59}" type="datetimeFigureOut">
               <a:rPr lang="cs-CZ" smtClean="0"/>
-              <a:t>10.10.2016</a:t>
+              <a:t>19.10.2016</a:t>
             </a:fld>
             <a:endParaRPr lang="cs-CZ" dirty="0"/>
           </a:p>
@@ -3581,7 +3581,7 @@
           <a:p>
             <a:fld id="{7F7304AD-F242-4632-87E6-EC5F38A9AA59}" type="datetimeFigureOut">
               <a:rPr lang="cs-CZ" smtClean="0"/>
-              <a:t>10.10.2016</a:t>
+              <a:t>19.10.2016</a:t>
             </a:fld>
             <a:endParaRPr lang="cs-CZ" dirty="0"/>
           </a:p>
@@ -3768,7 +3768,7 @@
           <a:p>
             <a:fld id="{7F7304AD-F242-4632-87E6-EC5F38A9AA59}" type="datetimeFigureOut">
               <a:rPr lang="cs-CZ" smtClean="0"/>
-              <a:t>10.10.2016</a:t>
+              <a:t>19.10.2016</a:t>
             </a:fld>
             <a:endParaRPr lang="cs-CZ" dirty="0"/>
           </a:p>
@@ -4003,7 +4003,7 @@
           <a:p>
             <a:fld id="{7F7304AD-F242-4632-87E6-EC5F38A9AA59}" type="datetimeFigureOut">
               <a:rPr lang="cs-CZ" smtClean="0"/>
-              <a:t>10.10.2016</a:t>
+              <a:t>19.10.2016</a:t>
             </a:fld>
             <a:endParaRPr lang="cs-CZ" dirty="0"/>
           </a:p>
@@ -4195,7 +4195,7 @@
           <a:p>
             <a:fld id="{7F7304AD-F242-4632-87E6-EC5F38A9AA59}" type="datetimeFigureOut">
               <a:rPr lang="cs-CZ" smtClean="0"/>
-              <a:t>10.10.2016</a:t>
+              <a:t>19.10.2016</a:t>
             </a:fld>
             <a:endParaRPr lang="cs-CZ" dirty="0"/>
           </a:p>
@@ -4496,7 +4496,7 @@
           <a:p>
             <a:fld id="{7F7304AD-F242-4632-87E6-EC5F38A9AA59}" type="datetimeFigureOut">
               <a:rPr lang="cs-CZ" smtClean="0"/>
-              <a:t>10.10.2016</a:t>
+              <a:t>19.10.2016</a:t>
             </a:fld>
             <a:endParaRPr lang="cs-CZ" dirty="0"/>
           </a:p>
@@ -4750,7 +4750,7 @@
           <a:p>
             <a:fld id="{7F7304AD-F242-4632-87E6-EC5F38A9AA59}" type="datetimeFigureOut">
               <a:rPr lang="cs-CZ" smtClean="0"/>
-              <a:t>10.10.2016</a:t>
+              <a:t>19.10.2016</a:t>
             </a:fld>
             <a:endParaRPr lang="cs-CZ" dirty="0"/>
           </a:p>
@@ -5141,7 +5141,7 @@
           <a:p>
             <a:fld id="{7F7304AD-F242-4632-87E6-EC5F38A9AA59}" type="datetimeFigureOut">
               <a:rPr lang="cs-CZ" smtClean="0"/>
-              <a:t>10.10.2016</a:t>
+              <a:t>19.10.2016</a:t>
             </a:fld>
             <a:endParaRPr lang="cs-CZ" dirty="0"/>
           </a:p>
@@ -5271,7 +5271,7 @@
           <a:p>
             <a:fld id="{7F7304AD-F242-4632-87E6-EC5F38A9AA59}" type="datetimeFigureOut">
               <a:rPr lang="cs-CZ" smtClean="0"/>
-              <a:t>10.10.2016</a:t>
+              <a:t>19.10.2016</a:t>
             </a:fld>
             <a:endParaRPr lang="cs-CZ" dirty="0"/>
           </a:p>
@@ -5378,7 +5378,7 @@
           <a:p>
             <a:fld id="{7F7304AD-F242-4632-87E6-EC5F38A9AA59}" type="datetimeFigureOut">
               <a:rPr lang="cs-CZ" smtClean="0"/>
-              <a:t>10.10.2016</a:t>
+              <a:t>19.10.2016</a:t>
             </a:fld>
             <a:endParaRPr lang="cs-CZ" dirty="0"/>
           </a:p>
@@ -5639,7 +5639,7 @@
           <a:p>
             <a:fld id="{7F7304AD-F242-4632-87E6-EC5F38A9AA59}" type="datetimeFigureOut">
               <a:rPr lang="cs-CZ" smtClean="0"/>
-              <a:t>10.10.2016</a:t>
+              <a:t>19.10.2016</a:t>
             </a:fld>
             <a:endParaRPr lang="cs-CZ" dirty="0"/>
           </a:p>
@@ -5908,7 +5908,7 @@
           <a:p>
             <a:fld id="{7F7304AD-F242-4632-87E6-EC5F38A9AA59}" type="datetimeFigureOut">
               <a:rPr lang="cs-CZ" smtClean="0"/>
-              <a:t>10.10.2016</a:t>
+              <a:t>19.10.2016</a:t>
             </a:fld>
             <a:endParaRPr lang="cs-CZ" dirty="0"/>
           </a:p>
@@ -6163,7 +6163,7 @@
           <a:p>
             <a:fld id="{7F7304AD-F242-4632-87E6-EC5F38A9AA59}" type="datetimeFigureOut">
               <a:rPr lang="cs-CZ" smtClean="0"/>
-              <a:t>10.10.2016</a:t>
+              <a:t>19.10.2016</a:t>
             </a:fld>
             <a:endParaRPr lang="cs-CZ" dirty="0"/>
           </a:p>
@@ -6846,7 +6846,7 @@
                   <a:schemeClr val="accent3"/>
                 </a:solidFill>
               </a:rPr>
-              <a:t>kid</a:t>
+              <a:t>kit</a:t>
             </a:r>
             <a:r>
               <a:rPr lang="cs-CZ" dirty="0">
@@ -6914,12 +6914,12 @@
               <a:t> </a:t>
             </a:r>
             <a:r>
-              <a:rPr lang="cs-CZ" dirty="0" err="1">
+              <a:rPr lang="cs-CZ">
                 <a:solidFill>
                   <a:schemeClr val="accent3"/>
                 </a:solidFill>
               </a:rPr>
-              <a:t>kid</a:t>
+              <a:t>kit </a:t>
             </a:r>
             <a:r>
               <a:rPr lang="cs-CZ" dirty="0">
@@ -6927,7 +6927,7 @@
                   <a:schemeClr val="accent3"/>
                 </a:solidFill>
               </a:rPr>
-              <a:t> - je to samé, jako JDK. Existují tyto dva názvy</a:t>
+              <a:t>- je to samé, jako JDK. Existují tyto dva názvy</a:t>
             </a:r>
           </a:p>
           <a:p>
@@ -15869,12 +15869,6 @@
           <a:p>
             <a:r>
               <a:rPr lang="cs-CZ" dirty="0"/>
-              <a:t>HTML</a:t>
-            </a:r>
-          </a:p>
-          <a:p>
-            <a:r>
-              <a:rPr lang="cs-CZ" dirty="0"/>
               <a:t>C++</a:t>
             </a:r>
           </a:p>
@@ -16450,112 +16444,6 @@
                                           <p:spTgt spid="3">
                                             <p:txEl>
                                               <p:pRg st="4" end="4"/>
-                                            </p:txEl>
-                                          </p:spTgt>
-                                        </p:tgtEl>
-                                      </p:cBhvr>
-                                    </p:animEffect>
-                                  </p:childTnLst>
-                                </p:cTn>
-                              </p:par>
-                            </p:childTnLst>
-                          </p:cTn>
-                        </p:par>
-                        <p:par>
-                          <p:cTn id="34" fill="hold">
-                            <p:stCondLst>
-                              <p:cond delay="3500"/>
-                            </p:stCondLst>
-                            <p:childTnLst>
-                              <p:par>
-                                <p:cTn id="35" presetID="53" presetClass="entr" presetSubtype="16" fill="hold" grpId="0" nodeType="afterEffect">
-                                  <p:stCondLst>
-                                    <p:cond delay="250"/>
-                                  </p:stCondLst>
-                                  <p:childTnLst>
-                                    <p:set>
-                                      <p:cBhvr>
-                                        <p:cTn id="36" dur="1" fill="hold">
-                                          <p:stCondLst>
-                                            <p:cond delay="0"/>
-                                          </p:stCondLst>
-                                        </p:cTn>
-                                        <p:tgtEl>
-                                          <p:spTgt spid="3">
-                                            <p:txEl>
-                                              <p:pRg st="5" end="5"/>
-                                            </p:txEl>
-                                          </p:spTgt>
-                                        </p:tgtEl>
-                                        <p:attrNameLst>
-                                          <p:attrName>style.visibility</p:attrName>
-                                        </p:attrNameLst>
-                                      </p:cBhvr>
-                                      <p:to>
-                                        <p:strVal val="visible"/>
-                                      </p:to>
-                                    </p:set>
-                                    <p:anim calcmode="lin" valueType="num">
-                                      <p:cBhvr>
-                                        <p:cTn id="37" dur="500" fill="hold"/>
-                                        <p:tgtEl>
-                                          <p:spTgt spid="3">
-                                            <p:txEl>
-                                              <p:pRg st="5" end="5"/>
-                                            </p:txEl>
-                                          </p:spTgt>
-                                        </p:tgtEl>
-                                        <p:attrNameLst>
-                                          <p:attrName>ppt_w</p:attrName>
-                                        </p:attrNameLst>
-                                      </p:cBhvr>
-                                      <p:tavLst>
-                                        <p:tav tm="0">
-                                          <p:val>
-                                            <p:fltVal val="0"/>
-                                          </p:val>
-                                        </p:tav>
-                                        <p:tav tm="100000">
-                                          <p:val>
-                                            <p:strVal val="#ppt_w"/>
-                                          </p:val>
-                                        </p:tav>
-                                      </p:tavLst>
-                                    </p:anim>
-                                    <p:anim calcmode="lin" valueType="num">
-                                      <p:cBhvr>
-                                        <p:cTn id="38" dur="500" fill="hold"/>
-                                        <p:tgtEl>
-                                          <p:spTgt spid="3">
-                                            <p:txEl>
-                                              <p:pRg st="5" end="5"/>
-                                            </p:txEl>
-                                          </p:spTgt>
-                                        </p:tgtEl>
-                                        <p:attrNameLst>
-                                          <p:attrName>ppt_h</p:attrName>
-                                        </p:attrNameLst>
-                                      </p:cBhvr>
-                                      <p:tavLst>
-                                        <p:tav tm="0">
-                                          <p:val>
-                                            <p:fltVal val="0"/>
-                                          </p:val>
-                                        </p:tav>
-                                        <p:tav tm="100000">
-                                          <p:val>
-                                            <p:strVal val="#ppt_h"/>
-                                          </p:val>
-                                        </p:tav>
-                                      </p:tavLst>
-                                    </p:anim>
-                                    <p:animEffect transition="in" filter="fade">
-                                      <p:cBhvr>
-                                        <p:cTn id="39" dur="500"/>
-                                        <p:tgtEl>
-                                          <p:spTgt spid="3">
-                                            <p:txEl>
-                                              <p:pRg st="5" end="5"/>
                                             </p:txEl>
                                           </p:spTgt>
                                         </p:tgtEl>
@@ -16666,7 +16554,7 @@
           <a:p>
             <a:r>
               <a:rPr lang="cs-CZ" dirty="0"/>
-              <a:t>Veškeré licence jsou zdarma</a:t>
+              <a:t>Je open source</a:t>
             </a:r>
           </a:p>
           <a:p>
@@ -16685,7 +16573,7 @@
             <a:pPr lvl="1"/>
             <a:r>
               <a:rPr lang="cs-CZ" sz="1800" dirty="0"/>
-              <a:t>J2SE – </a:t>
+              <a:t>JSE – </a:t>
             </a:r>
             <a:r>
               <a:rPr lang="cs-CZ" sz="1800" dirty="0">
@@ -16716,7 +16604,7 @@
             <a:pPr lvl="1"/>
             <a:r>
               <a:rPr lang="cs-CZ" sz="1800" dirty="0"/>
-              <a:t>J2EE – </a:t>
+              <a:t>JEE – </a:t>
             </a:r>
             <a:r>
               <a:rPr lang="cs-CZ" sz="1800" dirty="0">
@@ -16763,7 +16651,7 @@
             <a:pPr lvl="1"/>
             <a:r>
               <a:rPr lang="cs-CZ" sz="1800" dirty="0"/>
-              <a:t>J2ME – </a:t>
+              <a:t>JME – </a:t>
             </a:r>
             <a:r>
               <a:rPr lang="cs-CZ" sz="1800" dirty="0">

</xml_diff>